<commit_message>
Male promjene u prezentaciji
</commit_message>
<xml_diff>
--- a/PrezentacijaProjekata.pptx
+++ b/PrezentacijaProjekata.pptx
@@ -206,7 +206,7 @@
           <a:p>
             <a:fld id="{A57596D4-CB16-4BAD-83F6-7E8077D61F81}" type="datetimeFigureOut">
               <a:rPr lang="hr-HR" smtClean="0"/>
-              <a:t>6.1.2023.</a:t>
+              <a:t>8.1.2023.</a:t>
             </a:fld>
             <a:endParaRPr lang="hr-HR"/>
           </a:p>
@@ -3939,7 +3939,7 @@
           <a:p>
             <a:fld id="{E46E8F5E-7C26-4DBA-9CDF-6E3092DFB447}" type="datetime1">
               <a:rPr lang="hr-HR" smtClean="0"/>
-              <a:t>6.1.2023.</a:t>
+              <a:t>8.1.2023.</a:t>
             </a:fld>
             <a:endParaRPr lang="hr-HR"/>
           </a:p>
@@ -4165,7 +4165,7 @@
           <a:p>
             <a:fld id="{E46E8F5E-7C26-4DBA-9CDF-6E3092DFB447}" type="datetime1">
               <a:rPr lang="hr-HR" smtClean="0"/>
-              <a:t>6.1.2023.</a:t>
+              <a:t>8.1.2023.</a:t>
             </a:fld>
             <a:endParaRPr lang="hr-HR"/>
           </a:p>
@@ -5211,6 +5211,9 @@
             </a:r>
           </a:p>
           <a:p>
+            <a:endParaRPr lang="hr-HR" dirty="0"/>
+          </a:p>
+          <a:p>
             <a:r>
               <a:rPr lang="hr-HR" dirty="0"/>
               <a:t>Postoji li na tržištu sličan programski proizvod?</a:t>
@@ -5312,35 +5315,66 @@
         </p:nvSpPr>
         <p:spPr/>
         <p:txBody>
-          <a:bodyPr/>
+          <a:bodyPr>
+            <a:normAutofit/>
+          </a:bodyPr>
           <a:lstStyle/>
           <a:p>
+            <a:pPr marL="0" indent="0">
+              <a:buNone/>
+            </a:pPr>
             <a:r>
               <a:rPr lang="hr-HR" dirty="0"/>
-              <a:t>Lista glavnih funkcionalnih zahtjeva (</a:t>
-            </a:r>
-            <a:r>
-              <a:rPr lang="hr-HR" dirty="0" err="1"/>
-              <a:t>max</a:t>
-            </a:r>
+              <a:t>Lista glavnih funkcionalnih zahtjeva:</a:t>
+            </a:r>
+          </a:p>
+          <a:p>
             <a:r>
               <a:rPr lang="hr-HR" dirty="0"/>
-              <a:t> 1 slajd)</a:t>
-            </a:r>
-          </a:p>
-          <a:p>
+              <a:t>asd</a:t>
+            </a:r>
+          </a:p>
+          <a:p>
+            <a:pPr marL="0" indent="0">
+              <a:buNone/>
+            </a:pPr>
+            <a:endParaRPr lang="hr-HR" dirty="0"/>
+          </a:p>
+          <a:p>
+            <a:pPr marL="0" indent="0">
+              <a:buNone/>
+            </a:pPr>
+            <a:endParaRPr lang="hr-HR" dirty="0"/>
+          </a:p>
+          <a:p>
+            <a:pPr marL="0" indent="0">
+              <a:buNone/>
+            </a:pPr>
+            <a:endParaRPr lang="hr-HR" dirty="0"/>
+          </a:p>
+          <a:p>
+            <a:pPr marL="0" indent="0">
+              <a:buNone/>
+            </a:pPr>
             <a:r>
               <a:rPr lang="hr-HR" dirty="0"/>
-              <a:t>Nefunkcionalni i zahtjevi domene primjene (</a:t>
-            </a:r>
-            <a:r>
-              <a:rPr lang="hr-HR" dirty="0" err="1"/>
-              <a:t>max</a:t>
-            </a:r>
+              <a:t>Nefunkcionalni i zahtjevi domene primjene:</a:t>
+            </a:r>
+          </a:p>
+          <a:p>
             <a:r>
               <a:rPr lang="hr-HR" dirty="0"/>
-              <a:t> 1 slajd)</a:t>
-            </a:r>
+              <a:t>ReactJS</a:t>
+            </a:r>
+          </a:p>
+          <a:p>
+            <a:r>
+              <a:rPr lang="hr-HR" dirty="0"/>
+              <a:t>SpringBoot</a:t>
+            </a:r>
+          </a:p>
+          <a:p>
+            <a:endParaRPr lang="hr-HR" dirty="0"/>
           </a:p>
         </p:txBody>
       </p:sp>
@@ -5807,14 +5841,32 @@
           <a:p>
             <a:r>
               <a:rPr lang="hr-HR" dirty="0"/>
-              <a:t>Što je bilo dobro, a što je moglo bolje</a:t>
+              <a:t>Korištenje Git-a</a:t>
+            </a:r>
+          </a:p>
+          <a:p>
+            <a:r>
+              <a:rPr lang="hr-HR" dirty="0"/>
+              <a:t>Važnost komunikacije</a:t>
+            </a:r>
+          </a:p>
+          <a:p>
+            <a:endParaRPr lang="hr-HR" dirty="0"/>
+          </a:p>
+          <a:p>
+            <a:endParaRPr lang="hr-HR" dirty="0"/>
+          </a:p>
+          <a:p>
+            <a:r>
+              <a:rPr lang="hr-HR" dirty="0"/>
+              <a:t>Lose stvari</a:t>
             </a:r>
           </a:p>
           <a:p>
             <a:pPr lvl="1"/>
             <a:r>
               <a:rPr lang="hr-HR" dirty="0"/>
-              <a:t>A što se nikako ne bi smjelo ponoviti </a:t>
+              <a:t>i što se nikako ne bi smjelo ponoviti </a:t>
             </a:r>
             <a:r>
               <a:rPr lang="hr-HR" dirty="0">

</xml_diff>

<commit_message>
Dodan slajd s korištenim alatima
</commit_message>
<xml_diff>
--- a/PrezentacijaProjekata.pptx
+++ b/PrezentacijaProjekata.pptx
@@ -13,7 +13,7 @@
     <p:sldId id="258" r:id="rId4"/>
     <p:sldId id="265" r:id="rId5"/>
     <p:sldId id="259" r:id="rId6"/>
-    <p:sldId id="260" r:id="rId7"/>
+    <p:sldId id="266" r:id="rId7"/>
     <p:sldId id="261" r:id="rId8"/>
     <p:sldId id="262" r:id="rId9"/>
     <p:sldId id="263" r:id="rId10"/>
@@ -206,7 +206,7 @@
           <a:p>
             <a:fld id="{A57596D4-CB16-4BAD-83F6-7E8077D61F81}" type="datetimeFigureOut">
               <a:rPr lang="hr-HR" smtClean="0"/>
-              <a:t>8.1.2023.</a:t>
+              <a:t>12.1.2023.</a:t>
             </a:fld>
             <a:endParaRPr lang="hr-HR"/>
           </a:p>
@@ -3939,7 +3939,7 @@
           <a:p>
             <a:fld id="{E46E8F5E-7C26-4DBA-9CDF-6E3092DFB447}" type="datetime1">
               <a:rPr lang="hr-HR" smtClean="0"/>
-              <a:t>8.1.2023.</a:t>
+              <a:t>12.1.2023.</a:t>
             </a:fld>
             <a:endParaRPr lang="hr-HR"/>
           </a:p>
@@ -4165,7 +4165,7 @@
           <a:p>
             <a:fld id="{E46E8F5E-7C26-4DBA-9CDF-6E3092DFB447}" type="datetime1">
               <a:rPr lang="hr-HR" smtClean="0"/>
-              <a:t>8.1.2023.</a:t>
+              <a:t>12.1.2023.</a:t>
             </a:fld>
             <a:endParaRPr lang="hr-HR"/>
           </a:p>
@@ -5463,61 +5463,128 @@
             <p:ph idx="1"/>
           </p:nvPr>
         </p:nvSpPr>
-        <p:spPr/>
-        <p:txBody>
-          <a:bodyPr/>
+        <p:spPr>
+          <a:xfrm>
+            <a:off x="628650" y="1395554"/>
+            <a:ext cx="7886700" cy="4706481"/>
+          </a:xfrm>
+        </p:spPr>
+        <p:txBody>
+          <a:bodyPr>
+            <a:normAutofit fontScale="85000" lnSpcReduction="20000"/>
+          </a:bodyPr>
           <a:lstStyle/>
           <a:p>
             <a:r>
               <a:rPr lang="hr-HR" dirty="0"/>
-              <a:t>Popis svih korištenih alata (za izradu programske podrške, dokumentacije, komunikaciju i upravljanje)</a:t>
+              <a:t>Izrada programske podrške:</a:t>
             </a:r>
           </a:p>
           <a:p>
             <a:pPr lvl="1"/>
             <a:r>
               <a:rPr lang="hr-HR" dirty="0"/>
-              <a:t>Poželjno staviti linkove za web stranice pojedinih</a:t>
-            </a:r>
-          </a:p>
-          <a:p>
-            <a:pPr marL="457200" lvl="1" indent="0">
-              <a:buNone/>
-            </a:pPr>
+              <a:t>Intellij</a:t>
+            </a:r>
+          </a:p>
+          <a:p>
+            <a:pPr lvl="1"/>
+            <a:r>
+              <a:rPr lang="hr-HR" dirty="0"/>
+              <a:t>VSCode</a:t>
+            </a:r>
+          </a:p>
+          <a:p>
+            <a:r>
+              <a:rPr lang="hr-HR" dirty="0"/>
+              <a:t>Izrada dokumentacije:</a:t>
+            </a:r>
+          </a:p>
+          <a:p>
+            <a:pPr lvl="1"/>
+            <a:r>
+              <a:rPr lang="hr-HR" dirty="0"/>
+              <a:t>AstahUML</a:t>
+            </a:r>
+          </a:p>
+          <a:p>
+            <a:pPr lvl="1"/>
+            <a:r>
+              <a:rPr lang="hr-HR" dirty="0"/>
+              <a:t>LaTeX</a:t>
+            </a:r>
+          </a:p>
+          <a:p>
+            <a:r>
+              <a:rPr lang="hr-HR" dirty="0"/>
+              <a:t>Komunikacija</a:t>
+            </a:r>
+          </a:p>
+          <a:p>
+            <a:pPr lvl="1"/>
+            <a:r>
+              <a:rPr lang="hr-HR" dirty="0"/>
+              <a:t>Discord</a:t>
+            </a:r>
+          </a:p>
+          <a:p>
+            <a:r>
+              <a:rPr lang="hr-HR" dirty="0"/>
+              <a:t>Izvorni kod</a:t>
+            </a:r>
+          </a:p>
+          <a:p>
+            <a:pPr lvl="1"/>
+            <a:r>
+              <a:rPr lang="hr-HR" dirty="0"/>
+              <a:t>GitLab</a:t>
+            </a:r>
+          </a:p>
+          <a:p>
+            <a:r>
+              <a:rPr lang="hr-HR" dirty="0"/>
+              <a:t>Backend</a:t>
+            </a:r>
+          </a:p>
+          <a:p>
+            <a:pPr lvl="1"/>
+            <a:r>
+              <a:rPr lang="hr-HR" dirty="0"/>
+              <a:t>Spring Boot + Java</a:t>
+            </a:r>
+          </a:p>
+          <a:p>
+            <a:pPr lvl="1"/>
+            <a:r>
+              <a:rPr lang="hr-HR" dirty="0"/>
+              <a:t>PgAdmin + Sql</a:t>
+            </a:r>
+          </a:p>
+          <a:p>
+            <a:r>
+              <a:rPr lang="hr-HR" dirty="0"/>
+              <a:t>Frontend</a:t>
+            </a:r>
+          </a:p>
+          <a:p>
+            <a:pPr lvl="1"/>
+            <a:r>
+              <a:rPr lang="hr-HR" dirty="0"/>
+              <a:t>React + JavaScript</a:t>
+            </a:r>
+          </a:p>
+          <a:p>
+            <a:pPr lvl="1"/>
             <a:endParaRPr lang="hr-HR" dirty="0"/>
           </a:p>
           <a:p>
-            <a:r>
-              <a:rPr lang="hr-HR" dirty="0"/>
-              <a:t>Korišteni programski jezici i tehnologije</a:t>
-            </a:r>
-          </a:p>
-          <a:p>
             <a:pPr lvl="1"/>
-            <a:r>
-              <a:rPr lang="hr-HR" dirty="0"/>
-              <a:t>Naznačiti što je korišteno za front </a:t>
-            </a:r>
-            <a:r>
-              <a:rPr lang="hr-HR" dirty="0" err="1"/>
-              <a:t>end</a:t>
-            </a:r>
-            <a:r>
-              <a:rPr lang="hr-HR" dirty="0"/>
-              <a:t> a što za </a:t>
-            </a:r>
-            <a:r>
-              <a:rPr lang="hr-HR" dirty="0" err="1"/>
-              <a:t>back</a:t>
-            </a:r>
-            <a:r>
-              <a:rPr lang="hr-HR" dirty="0"/>
-              <a:t> </a:t>
-            </a:r>
-            <a:r>
-              <a:rPr lang="hr-HR" dirty="0" err="1"/>
-              <a:t>end</a:t>
-            </a:r>
+            <a:endParaRPr lang="hr-HR" dirty="0"/>
+          </a:p>
+          <a:p>
+            <a:endParaRPr lang="hr-HR" dirty="0"/>
+          </a:p>
+          <a:p>
             <a:endParaRPr lang="hr-HR" dirty="0"/>
           </a:p>
         </p:txBody>
@@ -5537,18 +5604,84 @@
           <a:bodyPr/>
           <a:lstStyle/>
           <a:p>
+            <a:pPr marL="0" marR="0" lvl="0" indent="0" algn="r" defTabSz="457200" rtl="0" eaLnBrk="1" fontAlgn="auto" latinLnBrk="0" hangingPunct="1">
+              <a:lnSpc>
+                <a:spcPct val="100000"/>
+              </a:lnSpc>
+              <a:spcBef>
+                <a:spcPts val="0"/>
+              </a:spcBef>
+              <a:spcAft>
+                <a:spcPts val="0"/>
+              </a:spcAft>
+              <a:buClrTx/>
+              <a:buSzTx/>
+              <a:buFontTx/>
+              <a:buNone/>
+              <a:tabLst/>
+              <a:defRPr/>
+            </a:pPr>
             <a:fld id="{FAA41844-C0CA-4144-9D6C-D993F0C0FAB4}" type="slidenum">
-              <a:rPr lang="hr-HR" smtClean="0"/>
+              <a:rPr kumimoji="0" lang="hr-HR" sz="1200" b="0" i="0" u="none" strike="noStrike" kern="1200" cap="none" spc="0" normalizeH="0" baseline="0" noProof="0" smtClean="0">
+                <a:ln>
+                  <a:noFill/>
+                </a:ln>
+                <a:solidFill>
+                  <a:prstClr val="black">
+                    <a:lumMod val="75000"/>
+                    <a:lumOff val="25000"/>
+                  </a:prstClr>
+                </a:solidFill>
+                <a:effectLst/>
+                <a:uLnTx/>
+                <a:uFillTx/>
+                <a:latin typeface="Franklin Gothic Book"/>
+                <a:ea typeface="+mn-ea"/>
+                <a:cs typeface="+mn-cs"/>
+              </a:rPr>
+              <a:pPr marL="0" marR="0" lvl="0" indent="0" algn="r" defTabSz="457200" rtl="0" eaLnBrk="1" fontAlgn="auto" latinLnBrk="0" hangingPunct="1">
+                <a:lnSpc>
+                  <a:spcPct val="100000"/>
+                </a:lnSpc>
+                <a:spcBef>
+                  <a:spcPts val="0"/>
+                </a:spcBef>
+                <a:spcAft>
+                  <a:spcPts val="0"/>
+                </a:spcAft>
+                <a:buClrTx/>
+                <a:buSzTx/>
+                <a:buFontTx/>
+                <a:buNone/>
+                <a:tabLst/>
+                <a:defRPr/>
+              </a:pPr>
               <a:t>6</a:t>
             </a:fld>
-            <a:endParaRPr lang="hr-HR"/>
+            <a:endParaRPr kumimoji="0" lang="hr-HR" sz="1200" b="0" i="0" u="none" strike="noStrike" kern="1200" cap="none" spc="0" normalizeH="0" baseline="0" noProof="0">
+              <a:ln>
+                <a:noFill/>
+              </a:ln>
+              <a:solidFill>
+                <a:prstClr val="black">
+                  <a:lumMod val="75000"/>
+                  <a:lumOff val="25000"/>
+                </a:prstClr>
+              </a:solidFill>
+              <a:effectLst/>
+              <a:uLnTx/>
+              <a:uFillTx/>
+              <a:latin typeface="Franklin Gothic Book"/>
+              <a:ea typeface="+mn-ea"/>
+              <a:cs typeface="+mn-cs"/>
+            </a:endParaRPr>
           </a:p>
         </p:txBody>
       </p:sp>
     </p:spTree>
     <p:extLst>
       <p:ext uri="{BB962C8B-B14F-4D97-AF65-F5344CB8AC3E}">
-        <p14:creationId xmlns:p14="http://schemas.microsoft.com/office/powerpoint/2010/main" val="3389772446"/>
+        <p14:creationId xmlns:p14="http://schemas.microsoft.com/office/powerpoint/2010/main" val="941607044"/>
       </p:ext>
     </p:extLst>
   </p:cSld>

</xml_diff>

<commit_message>
Promijenjena dva (2) slidea na prezentaciji
</commit_message>
<xml_diff>
--- a/PrezentacijaProjekata.pptx
+++ b/PrezentacijaProjekata.pptx
@@ -5,7 +5,7 @@
     <p:sldMasterId id="2147483687" r:id="rId1"/>
   </p:sldMasterIdLst>
   <p:notesMasterIdLst>
-    <p:notesMasterId r:id="rId12"/>
+    <p:notesMasterId r:id="rId13"/>
   </p:notesMasterIdLst>
   <p:sldIdLst>
     <p:sldId id="256" r:id="rId2"/>
@@ -13,11 +13,12 @@
     <p:sldId id="258" r:id="rId4"/>
     <p:sldId id="265" r:id="rId5"/>
     <p:sldId id="259" r:id="rId6"/>
-    <p:sldId id="266" r:id="rId7"/>
-    <p:sldId id="261" r:id="rId8"/>
-    <p:sldId id="262" r:id="rId9"/>
-    <p:sldId id="263" r:id="rId10"/>
-    <p:sldId id="264" r:id="rId11"/>
+    <p:sldId id="267" r:id="rId7"/>
+    <p:sldId id="266" r:id="rId8"/>
+    <p:sldId id="261" r:id="rId9"/>
+    <p:sldId id="262" r:id="rId10"/>
+    <p:sldId id="263" r:id="rId11"/>
+    <p:sldId id="264" r:id="rId12"/>
   </p:sldIdLst>
   <p:sldSz cx="9144000" cy="6858000" type="screen4x3"/>
   <p:notesSz cx="6858000" cy="9144000"/>
@@ -206,7 +207,7 @@
           <a:p>
             <a:fld id="{A57596D4-CB16-4BAD-83F6-7E8077D61F81}" type="datetimeFigureOut">
               <a:rPr lang="hr-HR" smtClean="0"/>
-              <a:t>12.1.2023.</a:t>
+              <a:t>13.01.2023.</a:t>
             </a:fld>
             <a:endParaRPr lang="hr-HR"/>
           </a:p>
@@ -3939,7 +3940,7 @@
           <a:p>
             <a:fld id="{E46E8F5E-7C26-4DBA-9CDF-6E3092DFB447}" type="datetime1">
               <a:rPr lang="hr-HR" smtClean="0"/>
-              <a:t>12.1.2023.</a:t>
+              <a:t>13.01.2023.</a:t>
             </a:fld>
             <a:endParaRPr lang="hr-HR"/>
           </a:p>
@@ -4165,7 +4166,7 @@
           <a:p>
             <a:fld id="{E46E8F5E-7C26-4DBA-9CDF-6E3092DFB447}" type="datetime1">
               <a:rPr lang="hr-HR" smtClean="0"/>
-              <a:t>12.1.2023.</a:t>
+              <a:t>13.01.2023.</a:t>
             </a:fld>
             <a:endParaRPr lang="hr-HR"/>
           </a:p>
@@ -4780,6 +4781,143 @@
           <a:lstStyle/>
           <a:p>
             <a:r>
+              <a:rPr lang="hr-HR" dirty="0"/>
+              <a:t>Naučene lekcije</a:t>
+            </a:r>
+          </a:p>
+        </p:txBody>
+      </p:sp>
+      <p:sp>
+        <p:nvSpPr>
+          <p:cNvPr id="3" name="Content Placeholder 2"/>
+          <p:cNvSpPr>
+            <a:spLocks noGrp="1"/>
+          </p:cNvSpPr>
+          <p:nvPr>
+            <p:ph idx="1"/>
+          </p:nvPr>
+        </p:nvSpPr>
+        <p:spPr/>
+        <p:txBody>
+          <a:bodyPr/>
+          <a:lstStyle/>
+          <a:p>
+            <a:r>
+              <a:rPr lang="hr-HR" dirty="0"/>
+              <a:t>Korištenje Git-a</a:t>
+            </a:r>
+          </a:p>
+          <a:p>
+            <a:r>
+              <a:rPr lang="hr-HR" dirty="0"/>
+              <a:t>Važnost komunikacije</a:t>
+            </a:r>
+          </a:p>
+          <a:p>
+            <a:endParaRPr lang="hr-HR" dirty="0"/>
+          </a:p>
+          <a:p>
+            <a:endParaRPr lang="hr-HR" dirty="0"/>
+          </a:p>
+          <a:p>
+            <a:r>
+              <a:rPr lang="hr-HR" dirty="0"/>
+              <a:t>Lose stvari</a:t>
+            </a:r>
+          </a:p>
+          <a:p>
+            <a:pPr lvl="1"/>
+            <a:r>
+              <a:rPr lang="hr-HR" dirty="0"/>
+              <a:t>i što se nikako ne bi smjelo ponoviti </a:t>
+            </a:r>
+            <a:r>
+              <a:rPr lang="hr-HR" dirty="0">
+                <a:sym typeface="Wingdings" panose="05000000000000000000" pitchFamily="2" charset="2"/>
+              </a:rPr>
+              <a:t></a:t>
+            </a:r>
+          </a:p>
+          <a:p>
+            <a:pPr lvl="1"/>
+            <a:endParaRPr lang="hr-HR" dirty="0">
+              <a:sym typeface="Wingdings" panose="05000000000000000000" pitchFamily="2" charset="2"/>
+            </a:endParaRPr>
+          </a:p>
+          <a:p>
+            <a:endParaRPr lang="hr-HR" dirty="0"/>
+          </a:p>
+        </p:txBody>
+      </p:sp>
+      <p:sp>
+        <p:nvSpPr>
+          <p:cNvPr id="4" name="Slide Number Placeholder 3"/>
+          <p:cNvSpPr>
+            <a:spLocks noGrp="1"/>
+          </p:cNvSpPr>
+          <p:nvPr>
+            <p:ph type="sldNum" sz="quarter" idx="12"/>
+          </p:nvPr>
+        </p:nvSpPr>
+        <p:spPr/>
+        <p:txBody>
+          <a:bodyPr/>
+          <a:lstStyle/>
+          <a:p>
+            <a:fld id="{FAA41844-C0CA-4144-9D6C-D993F0C0FAB4}" type="slidenum">
+              <a:rPr lang="hr-HR" smtClean="0"/>
+              <a:t>10</a:t>
+            </a:fld>
+            <a:endParaRPr lang="hr-HR"/>
+          </a:p>
+        </p:txBody>
+      </p:sp>
+    </p:spTree>
+    <p:extLst>
+      <p:ext uri="{BB962C8B-B14F-4D97-AF65-F5344CB8AC3E}">
+        <p14:creationId xmlns:p14="http://schemas.microsoft.com/office/powerpoint/2010/main" val="48259320"/>
+      </p:ext>
+    </p:extLst>
+  </p:cSld>
+  <p:clrMapOvr>
+    <a:masterClrMapping/>
+  </p:clrMapOvr>
+</p:sld>
+</file>
+
+<file path=ppt/slides/slide11.xml><?xml version="1.0" encoding="utf-8"?>
+<p:sld xmlns:a="http://schemas.openxmlformats.org/drawingml/2006/main" xmlns:r="http://schemas.openxmlformats.org/officeDocument/2006/relationships" xmlns:p="http://schemas.openxmlformats.org/presentationml/2006/main">
+  <p:cSld>
+    <p:spTree>
+      <p:nvGrpSpPr>
+        <p:cNvPr id="1" name=""/>
+        <p:cNvGrpSpPr/>
+        <p:nvPr/>
+      </p:nvGrpSpPr>
+      <p:grpSpPr>
+        <a:xfrm>
+          <a:off x="0" y="0"/>
+          <a:ext cx="0" cy="0"/>
+          <a:chOff x="0" y="0"/>
+          <a:chExt cx="0" cy="0"/>
+        </a:xfrm>
+      </p:grpSpPr>
+      <p:sp>
+        <p:nvSpPr>
+          <p:cNvPr id="2" name="Title 1"/>
+          <p:cNvSpPr>
+            <a:spLocks noGrp="1"/>
+          </p:cNvSpPr>
+          <p:nvPr>
+            <p:ph type="title"/>
+          </p:nvPr>
+        </p:nvSpPr>
+        <p:spPr/>
+        <p:txBody>
+          <a:bodyPr/>
+          <a:lstStyle/>
+          <a:p>
+            <a:r>
               <a:rPr lang="hr-HR" i="1" dirty="0"/>
               <a:t>Nekoliko savjeta</a:t>
             </a:r>
@@ -4897,7 +5035,7 @@
           <a:p>
             <a:fld id="{FAA41844-C0CA-4144-9D6C-D993F0C0FAB4}" type="slidenum">
               <a:rPr lang="hr-HR" smtClean="0"/>
-              <a:t>10</a:t>
+              <a:t>11</a:t>
             </a:fld>
             <a:endParaRPr lang="hr-HR"/>
           </a:p>
@@ -5207,23 +5345,35 @@
           <a:p>
             <a:r>
               <a:rPr lang="hr-HR" dirty="0"/>
-              <a:t>Ukratko iznesite osnovnu ideju, cilj i svrhu razvoja vašeg projekta</a:t>
-            </a:r>
-          </a:p>
-          <a:p>
-            <a:endParaRPr lang="hr-HR" dirty="0"/>
-          </a:p>
-          <a:p>
+              <a:t>Postojeća programska rješenja</a:t>
+            </a:r>
+          </a:p>
+          <a:p>
+            <a:pPr lvl="1"/>
             <a:r>
               <a:rPr lang="hr-HR" dirty="0"/>
-              <a:t>Postoji li na tržištu sličan programski proizvod?</a:t>
+              <a:t>njuškalo.hr</a:t>
+            </a:r>
+          </a:p>
+          <a:p>
+            <a:pPr lvl="2"/>
+            <a:r>
+              <a:rPr lang="hr-HR" dirty="0"/>
+              <a:t>Moguće postavljanje oglasa</a:t>
             </a:r>
           </a:p>
           <a:p>
             <a:pPr lvl="1"/>
             <a:r>
               <a:rPr lang="hr-HR" dirty="0"/>
-              <a:t>Usporedite značajke</a:t>
+              <a:t>Facebook Marketplace</a:t>
+            </a:r>
+          </a:p>
+          <a:p>
+            <a:pPr lvl="2"/>
+            <a:r>
+              <a:rPr lang="hr-HR" dirty="0"/>
+              <a:t>Moguće postavljanje oglasa</a:t>
             </a:r>
           </a:p>
         </p:txBody>
@@ -5331,8 +5481,41 @@
           <a:p>
             <a:r>
               <a:rPr lang="hr-HR" dirty="0"/>
-              <a:t>asd</a:t>
-            </a:r>
+              <a:t>Stvaranje zahtjeva i oglasa</a:t>
+            </a:r>
+          </a:p>
+          <a:p>
+            <a:r>
+              <a:rPr lang="hr-HR" dirty="0"/>
+              <a:t>Registracija vlastitog psa</a:t>
+            </a:r>
+          </a:p>
+          <a:p>
+            <a:r>
+              <a:rPr lang="hr-HR" dirty="0"/>
+              <a:t>Pregled postojećih zahtjeva i oglasa</a:t>
+            </a:r>
+          </a:p>
+          <a:p>
+            <a:r>
+              <a:rPr lang="hr-HR" dirty="0"/>
+              <a:t>Javljanje na zahtjev i oglas</a:t>
+            </a:r>
+          </a:p>
+          <a:p>
+            <a:r>
+              <a:rPr lang="hr-HR" dirty="0"/>
+              <a:t>Pronalazak najboljeg zahtjeva/oglasa za vlastiti oglas/zahtjev</a:t>
+            </a:r>
+          </a:p>
+          <a:p>
+            <a:r>
+              <a:rPr lang="hr-HR" dirty="0"/>
+              <a:t>Moderacija korisnika i oglasa</a:t>
+            </a:r>
+          </a:p>
+          <a:p>
+            <a:endParaRPr lang="hr-HR" dirty="0"/>
           </a:p>
           <a:p>
             <a:pPr marL="0" indent="0">
@@ -5351,27 +5534,6 @@
               <a:buNone/>
             </a:pPr>
             <a:endParaRPr lang="hr-HR" dirty="0"/>
-          </a:p>
-          <a:p>
-            <a:pPr marL="0" indent="0">
-              <a:buNone/>
-            </a:pPr>
-            <a:r>
-              <a:rPr lang="hr-HR" dirty="0"/>
-              <a:t>Nefunkcionalni i zahtjevi domene primjene:</a:t>
-            </a:r>
-          </a:p>
-          <a:p>
-            <a:r>
-              <a:rPr lang="hr-HR" dirty="0"/>
-              <a:t>ReactJS</a:t>
-            </a:r>
-          </a:p>
-          <a:p>
-            <a:r>
-              <a:rPr lang="hr-HR" dirty="0"/>
-              <a:t>SpringBoot</a:t>
-            </a:r>
           </a:p>
           <a:p>
             <a:endParaRPr lang="hr-HR" dirty="0"/>
@@ -5433,7 +5595,13 @@
       </p:grpSpPr>
       <p:sp>
         <p:nvSpPr>
-          <p:cNvPr id="2" name="Title 1"/>
+          <p:cNvPr id="2" name="Title 1">
+            <a:extLst>
+              <a:ext uri="{FF2B5EF4-FFF2-40B4-BE49-F238E27FC236}">
+                <a16:creationId xmlns:a16="http://schemas.microsoft.com/office/drawing/2014/main" id="{E3DB3AF1-5D18-C23D-835F-CF0F1FCF5E3D}"/>
+              </a:ext>
+            </a:extLst>
+          </p:cNvPr>
           <p:cNvSpPr>
             <a:spLocks noGrp="1"/>
           </p:cNvSpPr>
@@ -5448,14 +5616,21 @@
           <a:p>
             <a:r>
               <a:rPr lang="hr-HR" dirty="0"/>
-              <a:t>Korišteni alati i tehnologije</a:t>
-            </a:r>
-          </a:p>
-        </p:txBody>
-      </p:sp>
-      <p:sp>
-        <p:nvSpPr>
-          <p:cNvPr id="3" name="Content Placeholder 2"/>
+              <a:t>Pregled zahtjeva</a:t>
+            </a:r>
+            <a:endParaRPr lang="en-HR" dirty="0"/>
+          </a:p>
+        </p:txBody>
+      </p:sp>
+      <p:sp>
+        <p:nvSpPr>
+          <p:cNvPr id="3" name="Content Placeholder 2">
+            <a:extLst>
+              <a:ext uri="{FF2B5EF4-FFF2-40B4-BE49-F238E27FC236}">
+                <a16:creationId xmlns:a16="http://schemas.microsoft.com/office/drawing/2014/main" id="{3FCD5D9A-D419-E072-7224-BDF350940F9B}"/>
+              </a:ext>
+            </a:extLst>
+          </p:cNvPr>
           <p:cNvSpPr>
             <a:spLocks noGrp="1"/>
           </p:cNvSpPr>
@@ -5463,10 +5638,155 @@
             <p:ph idx="1"/>
           </p:nvPr>
         </p:nvSpPr>
+        <p:spPr/>
+        <p:txBody>
+          <a:bodyPr/>
+          <a:lstStyle/>
+          <a:p>
+            <a:pPr marL="0" indent="0">
+              <a:buNone/>
+            </a:pPr>
+            <a:r>
+              <a:rPr lang="hr-HR" dirty="0"/>
+              <a:t>Lista nefunkcionalnih zahtjeva:</a:t>
+            </a:r>
+          </a:p>
+          <a:p>
+            <a:r>
+              <a:rPr lang="hr-HR" dirty="0" err="1"/>
+              <a:t>ReactJS</a:t>
+            </a:r>
+            <a:endParaRPr lang="hr-HR" dirty="0"/>
+          </a:p>
+          <a:p>
+            <a:r>
+              <a:rPr lang="hr-HR" dirty="0" err="1"/>
+              <a:t>SpringBoot</a:t>
+            </a:r>
+            <a:endParaRPr lang="hr-HR" dirty="0"/>
+          </a:p>
+          <a:p>
+            <a:endParaRPr lang="hr-HR" dirty="0"/>
+          </a:p>
+          <a:p>
+            <a:pPr marL="0" indent="0">
+              <a:buNone/>
+            </a:pPr>
+            <a:r>
+              <a:rPr lang="hr-HR" dirty="0"/>
+              <a:t>Zahtjevi domene primjene:</a:t>
+            </a:r>
+          </a:p>
+          <a:p>
+            <a:pPr marL="0" indent="0">
+              <a:buNone/>
+            </a:pPr>
+            <a:r>
+              <a:rPr lang="hr-HR" dirty="0" err="1"/>
+              <a:t>asd</a:t>
+            </a:r>
+            <a:endParaRPr lang="hr-HR" dirty="0"/>
+          </a:p>
+          <a:p>
+            <a:endParaRPr lang="en-HR" dirty="0"/>
+          </a:p>
+        </p:txBody>
+      </p:sp>
+      <p:sp>
+        <p:nvSpPr>
+          <p:cNvPr id="4" name="Slide Number Placeholder 3">
+            <a:extLst>
+              <a:ext uri="{FF2B5EF4-FFF2-40B4-BE49-F238E27FC236}">
+                <a16:creationId xmlns:a16="http://schemas.microsoft.com/office/drawing/2014/main" id="{D3007583-0DAE-AA51-ACC1-25302532A757}"/>
+              </a:ext>
+            </a:extLst>
+          </p:cNvPr>
+          <p:cNvSpPr>
+            <a:spLocks noGrp="1"/>
+          </p:cNvSpPr>
+          <p:nvPr>
+            <p:ph type="sldNum" sz="quarter" idx="12"/>
+          </p:nvPr>
+        </p:nvSpPr>
+        <p:spPr/>
+        <p:txBody>
+          <a:bodyPr/>
+          <a:lstStyle/>
+          <a:p>
+            <a:fld id="{FAA41844-C0CA-4144-9D6C-D993F0C0FAB4}" type="slidenum">
+              <a:rPr lang="hr-HR" smtClean="0"/>
+              <a:t>6</a:t>
+            </a:fld>
+            <a:endParaRPr lang="hr-HR"/>
+          </a:p>
+        </p:txBody>
+      </p:sp>
+    </p:spTree>
+    <p:extLst>
+      <p:ext uri="{BB962C8B-B14F-4D97-AF65-F5344CB8AC3E}">
+        <p14:creationId xmlns:p14="http://schemas.microsoft.com/office/powerpoint/2010/main" val="2724805983"/>
+      </p:ext>
+    </p:extLst>
+  </p:cSld>
+  <p:clrMapOvr>
+    <a:masterClrMapping/>
+  </p:clrMapOvr>
+</p:sld>
+</file>
+
+<file path=ppt/slides/slide7.xml><?xml version="1.0" encoding="utf-8"?>
+<p:sld xmlns:a="http://schemas.openxmlformats.org/drawingml/2006/main" xmlns:r="http://schemas.openxmlformats.org/officeDocument/2006/relationships" xmlns:p="http://schemas.openxmlformats.org/presentationml/2006/main">
+  <p:cSld>
+    <p:spTree>
+      <p:nvGrpSpPr>
+        <p:cNvPr id="1" name=""/>
+        <p:cNvGrpSpPr/>
+        <p:nvPr/>
+      </p:nvGrpSpPr>
+      <p:grpSpPr>
+        <a:xfrm>
+          <a:off x="0" y="0"/>
+          <a:ext cx="0" cy="0"/>
+          <a:chOff x="0" y="0"/>
+          <a:chExt cx="0" cy="0"/>
+        </a:xfrm>
+      </p:grpSpPr>
+      <p:sp>
+        <p:nvSpPr>
+          <p:cNvPr id="2" name="Title 1"/>
+          <p:cNvSpPr>
+            <a:spLocks noGrp="1"/>
+          </p:cNvSpPr>
+          <p:nvPr>
+            <p:ph type="title"/>
+          </p:nvPr>
+        </p:nvSpPr>
+        <p:spPr/>
+        <p:txBody>
+          <a:bodyPr/>
+          <a:lstStyle/>
+          <a:p>
+            <a:r>
+              <a:rPr lang="hr-HR" dirty="0"/>
+              <a:t>Korišteni alati i tehnologije</a:t>
+            </a:r>
+          </a:p>
+        </p:txBody>
+      </p:sp>
+      <p:sp>
+        <p:nvSpPr>
+          <p:cNvPr id="3" name="Content Placeholder 2"/>
+          <p:cNvSpPr>
+            <a:spLocks noGrp="1"/>
+          </p:cNvSpPr>
+          <p:nvPr>
+            <p:ph idx="1"/>
+          </p:nvPr>
+        </p:nvSpPr>
         <p:spPr>
           <a:xfrm>
             <a:off x="628650" y="1395554"/>
-            <a:ext cx="7886700" cy="4706481"/>
+            <a:ext cx="7886700" cy="5366987"/>
           </a:xfrm>
         </p:spPr>
         <p:txBody>
@@ -5483,16 +5803,29 @@
           <a:p>
             <a:pPr lvl="1"/>
             <a:r>
+              <a:rPr lang="hr-HR" dirty="0" err="1"/>
+              <a:t>IntelliJ</a:t>
+            </a:r>
+            <a:r>
               <a:rPr lang="hr-HR" dirty="0"/>
-              <a:t>Intellij</a:t>
+              <a:t> IDEA</a:t>
             </a:r>
           </a:p>
           <a:p>
             <a:pPr lvl="1"/>
             <a:r>
-              <a:rPr lang="hr-HR" dirty="0"/>
+              <a:rPr lang="hr-HR" dirty="0" err="1"/>
               <a:t>VSCode</a:t>
             </a:r>
+            <a:endParaRPr lang="hr-HR" dirty="0"/>
+          </a:p>
+          <a:p>
+            <a:pPr lvl="1"/>
+            <a:r>
+              <a:rPr lang="hr-HR" dirty="0" err="1"/>
+              <a:t>WebStorm</a:t>
+            </a:r>
+            <a:endParaRPr lang="hr-HR" dirty="0"/>
           </a:p>
           <a:p>
             <a:r>
@@ -5656,7 +5989,7 @@
                 <a:tabLst/>
                 <a:defRPr/>
               </a:pPr>
-              <a:t>6</a:t>
+              <a:t>7</a:t>
             </a:fld>
             <a:endParaRPr kumimoji="0" lang="hr-HR" sz="1200" b="0" i="0" u="none" strike="noStrike" kern="1200" cap="none" spc="0" normalizeH="0" baseline="0" noProof="0">
               <a:ln>
@@ -5682,109 +6015,6 @@
     <p:extLst>
       <p:ext uri="{BB962C8B-B14F-4D97-AF65-F5344CB8AC3E}">
         <p14:creationId xmlns:p14="http://schemas.microsoft.com/office/powerpoint/2010/main" val="941607044"/>
-      </p:ext>
-    </p:extLst>
-  </p:cSld>
-  <p:clrMapOvr>
-    <a:masterClrMapping/>
-  </p:clrMapOvr>
-</p:sld>
-</file>
-
-<file path=ppt/slides/slide7.xml><?xml version="1.0" encoding="utf-8"?>
-<p:sld xmlns:a="http://schemas.openxmlformats.org/drawingml/2006/main" xmlns:r="http://schemas.openxmlformats.org/officeDocument/2006/relationships" xmlns:p="http://schemas.openxmlformats.org/presentationml/2006/main">
-  <p:cSld>
-    <p:spTree>
-      <p:nvGrpSpPr>
-        <p:cNvPr id="1" name=""/>
-        <p:cNvGrpSpPr/>
-        <p:nvPr/>
-      </p:nvGrpSpPr>
-      <p:grpSpPr>
-        <a:xfrm>
-          <a:off x="0" y="0"/>
-          <a:ext cx="0" cy="0"/>
-          <a:chOff x="0" y="0"/>
-          <a:chExt cx="0" cy="0"/>
-        </a:xfrm>
-      </p:grpSpPr>
-      <p:sp>
-        <p:nvSpPr>
-          <p:cNvPr id="2" name="Title 1"/>
-          <p:cNvSpPr>
-            <a:spLocks noGrp="1"/>
-          </p:cNvSpPr>
-          <p:nvPr>
-            <p:ph type="title"/>
-          </p:nvPr>
-        </p:nvSpPr>
-        <p:spPr/>
-        <p:txBody>
-          <a:bodyPr/>
-          <a:lstStyle/>
-          <a:p>
-            <a:r>
-              <a:rPr lang="hr-HR" dirty="0"/>
-              <a:t>Arhitektura sustava</a:t>
-            </a:r>
-          </a:p>
-        </p:txBody>
-      </p:sp>
-      <p:sp>
-        <p:nvSpPr>
-          <p:cNvPr id="3" name="Content Placeholder 2"/>
-          <p:cNvSpPr>
-            <a:spLocks noGrp="1"/>
-          </p:cNvSpPr>
-          <p:nvPr>
-            <p:ph idx="1"/>
-          </p:nvPr>
-        </p:nvSpPr>
-        <p:spPr/>
-        <p:txBody>
-          <a:bodyPr/>
-          <a:lstStyle/>
-          <a:p>
-            <a:r>
-              <a:rPr lang="hr-HR" dirty="0"/>
-              <a:t>Na visokoj razini apstrakcije</a:t>
-            </a:r>
-          </a:p>
-          <a:p>
-            <a:r>
-              <a:rPr lang="hr-HR" dirty="0"/>
-              <a:t>Obavezno staviti dijagram </a:t>
-            </a:r>
-          </a:p>
-        </p:txBody>
-      </p:sp>
-      <p:sp>
-        <p:nvSpPr>
-          <p:cNvPr id="4" name="Slide Number Placeholder 3"/>
-          <p:cNvSpPr>
-            <a:spLocks noGrp="1"/>
-          </p:cNvSpPr>
-          <p:nvPr>
-            <p:ph type="sldNum" sz="quarter" idx="12"/>
-          </p:nvPr>
-        </p:nvSpPr>
-        <p:spPr/>
-        <p:txBody>
-          <a:bodyPr/>
-          <a:lstStyle/>
-          <a:p>
-            <a:fld id="{FAA41844-C0CA-4144-9D6C-D993F0C0FAB4}" type="slidenum">
-              <a:rPr lang="hr-HR" smtClean="0"/>
-              <a:t>7</a:t>
-            </a:fld>
-            <a:endParaRPr lang="hr-HR"/>
-          </a:p>
-        </p:txBody>
-      </p:sp>
-    </p:spTree>
-    <p:extLst>
-      <p:ext uri="{BB962C8B-B14F-4D97-AF65-F5344CB8AC3E}">
-        <p14:creationId xmlns:p14="http://schemas.microsoft.com/office/powerpoint/2010/main" val="3657354464"/>
       </p:ext>
     </p:extLst>
   </p:cSld>
@@ -5828,7 +6058,7 @@
           <a:p>
             <a:r>
               <a:rPr lang="hr-HR" dirty="0"/>
-              <a:t>Organizacija rada</a:t>
+              <a:t>Arhitektura sustava</a:t>
             </a:r>
           </a:p>
         </p:txBody>
@@ -5850,34 +6080,13 @@
           <a:p>
             <a:r>
               <a:rPr lang="hr-HR" dirty="0"/>
-              <a:t>Vremenska linija razvoja (specifikacija, implementacija, ispitivanje, dokumentiranje)</a:t>
-            </a:r>
-          </a:p>
-          <a:p>
-            <a:pPr lvl="1"/>
+              <a:t>Na visokoj razini apstrakcije</a:t>
+            </a:r>
+          </a:p>
+          <a:p>
             <a:r>
               <a:rPr lang="hr-HR" dirty="0"/>
-              <a:t>Poželjan grafički prikaz</a:t>
-            </a:r>
-          </a:p>
-          <a:p>
-            <a:pPr marL="457200" lvl="1" indent="0">
-              <a:buNone/>
-            </a:pPr>
-            <a:endParaRPr lang="hr-HR" dirty="0"/>
-          </a:p>
-          <a:p>
-            <a:r>
-              <a:rPr lang="hr-HR" dirty="0"/>
-              <a:t>Raspodjela posla po članovima tima (koliko </a:t>
-            </a:r>
-            <a:r>
-              <a:rPr lang="hr-HR" dirty="0" err="1"/>
-              <a:t>developera</a:t>
-            </a:r>
-            <a:r>
-              <a:rPr lang="hr-HR" dirty="0"/>
-              <a:t>, koliko testera…)</a:t>
+              <a:t>Obavezno staviti dijagram </a:t>
             </a:r>
           </a:p>
         </p:txBody>
@@ -5908,7 +6117,7 @@
     </p:spTree>
     <p:extLst>
       <p:ext uri="{BB962C8B-B14F-4D97-AF65-F5344CB8AC3E}">
-        <p14:creationId xmlns:p14="http://schemas.microsoft.com/office/powerpoint/2010/main" val="4285223946"/>
+        <p14:creationId xmlns:p14="http://schemas.microsoft.com/office/powerpoint/2010/main" val="3657354464"/>
       </p:ext>
     </p:extLst>
   </p:cSld>
@@ -5952,7 +6161,7 @@
           <a:p>
             <a:r>
               <a:rPr lang="hr-HR" dirty="0"/>
-              <a:t>Naučene lekcije</a:t>
+              <a:t>Organizacija rada</a:t>
             </a:r>
           </a:p>
         </p:txBody>
@@ -5974,48 +6183,35 @@
           <a:p>
             <a:r>
               <a:rPr lang="hr-HR" dirty="0"/>
-              <a:t>Korištenje Git-a</a:t>
-            </a:r>
-          </a:p>
-          <a:p>
+              <a:t>Vremenska linija razvoja (specifikacija, implementacija, ispitivanje, dokumentiranje)</a:t>
+            </a:r>
+          </a:p>
+          <a:p>
+            <a:pPr lvl="1"/>
             <a:r>
               <a:rPr lang="hr-HR" dirty="0"/>
-              <a:t>Važnost komunikacije</a:t>
-            </a:r>
-          </a:p>
-          <a:p>
+              <a:t>Poželjan grafički prikaz</a:t>
+            </a:r>
+          </a:p>
+          <a:p>
+            <a:pPr marL="457200" lvl="1" indent="0">
+              <a:buNone/>
+            </a:pPr>
             <a:endParaRPr lang="hr-HR" dirty="0"/>
           </a:p>
           <a:p>
-            <a:endParaRPr lang="hr-HR" dirty="0"/>
-          </a:p>
-          <a:p>
             <a:r>
               <a:rPr lang="hr-HR" dirty="0"/>
-              <a:t>Lose stvari</a:t>
-            </a:r>
-          </a:p>
-          <a:p>
-            <a:pPr lvl="1"/>
+              <a:t>Raspodjela posla po članovima tima (koliko </a:t>
+            </a:r>
+            <a:r>
+              <a:rPr lang="hr-HR" dirty="0" err="1"/>
+              <a:t>developera</a:t>
+            </a:r>
             <a:r>
               <a:rPr lang="hr-HR" dirty="0"/>
-              <a:t>i što se nikako ne bi smjelo ponoviti </a:t>
-            </a:r>
-            <a:r>
-              <a:rPr lang="hr-HR" dirty="0">
-                <a:sym typeface="Wingdings" panose="05000000000000000000" pitchFamily="2" charset="2"/>
-              </a:rPr>
-              <a:t></a:t>
-            </a:r>
-          </a:p>
-          <a:p>
-            <a:pPr lvl="1"/>
-            <a:endParaRPr lang="hr-HR" dirty="0">
-              <a:sym typeface="Wingdings" panose="05000000000000000000" pitchFamily="2" charset="2"/>
-            </a:endParaRPr>
-          </a:p>
-          <a:p>
-            <a:endParaRPr lang="hr-HR" dirty="0"/>
+              <a:t>, koliko testera…)</a:t>
+            </a:r>
           </a:p>
         </p:txBody>
       </p:sp>
@@ -6045,7 +6241,7 @@
     </p:spTree>
     <p:extLst>
       <p:ext uri="{BB962C8B-B14F-4D97-AF65-F5344CB8AC3E}">
-        <p14:creationId xmlns:p14="http://schemas.microsoft.com/office/powerpoint/2010/main" val="48259320"/>
+        <p14:creationId xmlns:p14="http://schemas.microsoft.com/office/powerpoint/2010/main" val="4285223946"/>
       </p:ext>
     </p:extLst>
   </p:cSld>

</xml_diff>

<commit_message>
Dodana zavrsna verzija prezentacije
</commit_message>
<xml_diff>
--- a/PrezentacijaProjekata.pptx
+++ b/PrezentacijaProjekata.pptx
@@ -207,7 +207,7 @@
           <a:p>
             <a:fld id="{A57596D4-CB16-4BAD-83F6-7E8077D61F81}" type="datetimeFigureOut">
               <a:rPr lang="hr-HR" smtClean="0"/>
-              <a:t>13.01.2023.</a:t>
+              <a:t>13.1.2023.</a:t>
             </a:fld>
             <a:endParaRPr lang="hr-HR"/>
           </a:p>
@@ -3940,7 +3940,7 @@
           <a:p>
             <a:fld id="{E46E8F5E-7C26-4DBA-9CDF-6E3092DFB447}" type="datetime1">
               <a:rPr lang="hr-HR" smtClean="0"/>
-              <a:t>13.01.2023.</a:t>
+              <a:t>13.1.2023.</a:t>
             </a:fld>
             <a:endParaRPr lang="hr-HR"/>
           </a:p>
@@ -4166,7 +4166,7 @@
           <a:p>
             <a:fld id="{E46E8F5E-7C26-4DBA-9CDF-6E3092DFB447}" type="datetime1">
               <a:rPr lang="hr-HR" smtClean="0"/>
-              <a:t>13.01.2023.</a:t>
+              <a:t>13.1.2023.</a:t>
             </a:fld>
             <a:endParaRPr lang="hr-HR"/>
           </a:p>
@@ -6299,12 +6299,155 @@
           <a:p>
             <a:pPr lvl="1"/>
             <a:r>
+              <a:rPr lang="hr-HR" dirty="0"/>
+              <a:t>Antonio Lukić: Team </a:t>
+            </a:r>
+            <a:r>
+              <a:rPr lang="hr-HR" dirty="0" err="1"/>
+              <a:t>Lead</a:t>
+            </a:r>
+            <a:r>
+              <a:rPr lang="hr-HR" dirty="0"/>
+              <a:t>, QA, </a:t>
+            </a:r>
+            <a:r>
+              <a:rPr lang="hr-HR" dirty="0" err="1"/>
+              <a:t>Backend</a:t>
+            </a:r>
+            <a:endParaRPr lang="hr-HR" dirty="0"/>
+          </a:p>
+          <a:p>
+            <a:pPr lvl="1"/>
+            <a:r>
+              <a:rPr lang="hr-HR" dirty="0"/>
+              <a:t>Ivan </a:t>
+            </a:r>
+            <a:r>
+              <a:rPr lang="hr-HR" dirty="0" err="1"/>
+              <a:t>Kapusta</a:t>
+            </a:r>
+            <a:r>
+              <a:rPr lang="hr-HR" dirty="0"/>
+              <a:t>: </a:t>
+            </a:r>
+            <a:r>
               <a:rPr lang="hr-HR" dirty="0" err="1"/>
               <a:t>Frontend</a:t>
             </a:r>
             <a:r>
               <a:rPr lang="hr-HR" dirty="0"/>
-              <a:t>: Eugen </a:t>
+              <a:t>, </a:t>
+            </a:r>
+            <a:r>
+              <a:rPr lang="hr-HR" dirty="0" err="1"/>
+              <a:t>Deploy</a:t>
+            </a:r>
+            <a:endParaRPr lang="hr-HR" dirty="0"/>
+          </a:p>
+          <a:p>
+            <a:pPr lvl="1"/>
+            <a:r>
+              <a:rPr lang="hr-HR" dirty="0"/>
+              <a:t>Ivan Kuzmić: </a:t>
+            </a:r>
+            <a:r>
+              <a:rPr lang="hr-HR" dirty="0" err="1"/>
+              <a:t>Frontend</a:t>
+            </a:r>
+            <a:r>
+              <a:rPr lang="hr-HR" dirty="0"/>
+              <a:t> </a:t>
+            </a:r>
+            <a:r>
+              <a:rPr lang="hr-HR" dirty="0" err="1"/>
+              <a:t>support</a:t>
+            </a:r>
+            <a:r>
+              <a:rPr lang="hr-HR" dirty="0"/>
+              <a:t>, </a:t>
+            </a:r>
+            <a:r>
+              <a:rPr lang="hr-HR" dirty="0" err="1"/>
+              <a:t>Docs</a:t>
+            </a:r>
+            <a:endParaRPr lang="hr-HR" dirty="0"/>
+          </a:p>
+          <a:p>
+            <a:pPr lvl="1"/>
+            <a:r>
+              <a:rPr lang="hr-HR" dirty="0"/>
+              <a:t>Sven Leko: </a:t>
+            </a:r>
+            <a:r>
+              <a:rPr lang="hr-HR" dirty="0" err="1"/>
+              <a:t>Frontend</a:t>
+            </a:r>
+            <a:r>
+              <a:rPr lang="hr-HR" dirty="0"/>
+              <a:t>, </a:t>
+            </a:r>
+            <a:r>
+              <a:rPr lang="hr-HR" dirty="0" err="1"/>
+              <a:t>Deploy</a:t>
+            </a:r>
+            <a:endParaRPr lang="hr-HR" dirty="0"/>
+          </a:p>
+          <a:p>
+            <a:pPr lvl="1"/>
+            <a:r>
+              <a:rPr lang="hr-HR" dirty="0"/>
+              <a:t>Lovro </a:t>
+            </a:r>
+            <a:r>
+              <a:rPr lang="hr-HR" dirty="0" err="1"/>
+              <a:t>Malojčić</a:t>
+            </a:r>
+            <a:r>
+              <a:rPr lang="hr-HR" dirty="0"/>
+              <a:t>: </a:t>
+            </a:r>
+            <a:r>
+              <a:rPr lang="hr-HR" dirty="0" err="1"/>
+              <a:t>Frontend</a:t>
+            </a:r>
+            <a:r>
+              <a:rPr lang="hr-HR" dirty="0"/>
+              <a:t>, U/I</a:t>
+            </a:r>
+          </a:p>
+          <a:p>
+            <a:pPr lvl="1"/>
+            <a:r>
+              <a:rPr lang="hr-HR" dirty="0"/>
+              <a:t>Mario Petek: </a:t>
+            </a:r>
+            <a:r>
+              <a:rPr lang="hr-HR" dirty="0" err="1"/>
+              <a:t>Backend</a:t>
+            </a:r>
+            <a:r>
+              <a:rPr lang="hr-HR" dirty="0"/>
+              <a:t> </a:t>
+            </a:r>
+            <a:r>
+              <a:rPr lang="hr-HR" dirty="0" err="1"/>
+              <a:t>support</a:t>
+            </a:r>
+            <a:r>
+              <a:rPr lang="hr-HR" dirty="0"/>
+              <a:t>, </a:t>
+            </a:r>
+            <a:r>
+              <a:rPr lang="hr-HR" dirty="0" err="1"/>
+              <a:t>Docs</a:t>
+            </a:r>
+            <a:endParaRPr lang="hr-HR" dirty="0"/>
+          </a:p>
+          <a:p>
+            <a:pPr lvl="1"/>
+            <a:r>
+              <a:rPr lang="hr-HR" dirty="0"/>
+              <a:t>Eugen </a:t>
             </a:r>
             <a:r>
               <a:rPr lang="hr-HR" dirty="0" err="1"/>
@@ -6312,38 +6455,15 @@
             </a:r>
             <a:r>
               <a:rPr lang="hr-HR" dirty="0"/>
-              <a:t>, Lovro </a:t>
+              <a:t>: </a:t>
             </a:r>
             <a:r>
               <a:rPr lang="hr-HR" dirty="0" err="1"/>
-              <a:t>Malojčić</a:t>
+              <a:t>Frontend</a:t>
             </a:r>
             <a:r>
               <a:rPr lang="hr-HR" dirty="0"/>
-              <a:t>, Sven Leko, Ivan </a:t>
-            </a:r>
-            <a:r>
-              <a:rPr lang="hr-HR" dirty="0" err="1"/>
-              <a:t>Kapusta</a:t>
-            </a:r>
-            <a:endParaRPr lang="hr-HR" dirty="0"/>
-          </a:p>
-          <a:p>
-            <a:pPr lvl="1"/>
-            <a:r>
-              <a:rPr lang="hr-HR" dirty="0" err="1"/>
-              <a:t>Backend</a:t>
-            </a:r>
-            <a:r>
-              <a:rPr lang="hr-HR" dirty="0"/>
-              <a:t>: Antonio Lukić, Mario Petek</a:t>
-            </a:r>
-          </a:p>
-          <a:p>
-            <a:pPr lvl="1"/>
-            <a:r>
-              <a:rPr lang="hr-HR" dirty="0"/>
-              <a:t>Dokumentacija: Mario Petek, Ivan Kuzmić</a:t>
+              <a:t>, Design</a:t>
             </a:r>
           </a:p>
         </p:txBody>

</xml_diff>